<commit_message>
Off-grid Community of Houses model updated
</commit_message>
<xml_diff>
--- a/Docs/PPTs/WSU_UF_NFSCPS_GroupMeeting_SlideDeck.pptx
+++ b/Docs/PPTs/WSU_UF_NFSCPS_GroupMeeting_SlideDeck.pptx
@@ -221,7 +221,7 @@
           <a:p>
             <a:fld id="{A2F1B1B2-338D-4519-AE47-05D743294B25}" type="datetimeFigureOut">
               <a:rPr lang="en-US" smtClean="0"/>
-              <a:t>9/12/2023</a:t>
+              <a:t>9/15/2023</a:t>
             </a:fld>
             <a:endParaRPr lang="en-US"/>
           </a:p>
@@ -635,7 +635,7 @@
           <a:p>
             <a:fld id="{B1A858B9-89BB-4AEE-91EB-EE01B5663C5B}" type="datetime1">
               <a:rPr lang="en-US" smtClean="0"/>
-              <a:t>9/12/2023</a:t>
+              <a:t>9/15/2023</a:t>
             </a:fld>
             <a:endParaRPr lang="en-US"/>
           </a:p>
@@ -833,7 +833,7 @@
           <a:p>
             <a:fld id="{FD45B170-B2CD-4267-93DB-9E7A7D686686}" type="datetime1">
               <a:rPr lang="en-US" smtClean="0"/>
-              <a:t>9/12/2023</a:t>
+              <a:t>9/15/2023</a:t>
             </a:fld>
             <a:endParaRPr lang="en-US"/>
           </a:p>
@@ -1041,7 +1041,7 @@
           <a:p>
             <a:fld id="{9C03DCEC-1B40-4998-A2D1-90F4D2686771}" type="datetime1">
               <a:rPr lang="en-US" smtClean="0"/>
-              <a:t>9/12/2023</a:t>
+              <a:t>9/15/2023</a:t>
             </a:fld>
             <a:endParaRPr lang="en-US"/>
           </a:p>
@@ -1239,7 +1239,7 @@
           <a:p>
             <a:fld id="{A89F6699-5BEF-4896-85EE-74677173AE61}" type="datetime1">
               <a:rPr lang="en-US" smtClean="0"/>
-              <a:t>9/12/2023</a:t>
+              <a:t>9/15/2023</a:t>
             </a:fld>
             <a:endParaRPr lang="en-US"/>
           </a:p>
@@ -1514,7 +1514,7 @@
           <a:p>
             <a:fld id="{C2D627B6-7156-404E-BABF-895127D4C1A9}" type="datetime1">
               <a:rPr lang="en-US" smtClean="0"/>
-              <a:t>9/12/2023</a:t>
+              <a:t>9/15/2023</a:t>
             </a:fld>
             <a:endParaRPr lang="en-US"/>
           </a:p>
@@ -1779,7 +1779,7 @@
           <a:p>
             <a:fld id="{095398F5-3272-4981-828B-395EB19D2F90}" type="datetime1">
               <a:rPr lang="en-US" smtClean="0"/>
-              <a:t>9/12/2023</a:t>
+              <a:t>9/15/2023</a:t>
             </a:fld>
             <a:endParaRPr lang="en-US"/>
           </a:p>
@@ -2191,7 +2191,7 @@
           <a:p>
             <a:fld id="{4543A9A8-B9A8-4082-9127-4E93AD3DFAF2}" type="datetime1">
               <a:rPr lang="en-US" smtClean="0"/>
-              <a:t>9/12/2023</a:t>
+              <a:t>9/15/2023</a:t>
             </a:fld>
             <a:endParaRPr lang="en-US"/>
           </a:p>
@@ -2332,7 +2332,7 @@
           <a:p>
             <a:fld id="{E9D2B886-0F08-4895-9EF2-614F4DD14610}" type="datetime1">
               <a:rPr lang="en-US" smtClean="0"/>
-              <a:t>9/12/2023</a:t>
+              <a:t>9/15/2023</a:t>
             </a:fld>
             <a:endParaRPr lang="en-US"/>
           </a:p>
@@ -2445,7 +2445,7 @@
           <a:p>
             <a:fld id="{99196715-4EE5-432E-965D-07F0D9749ED8}" type="datetime1">
               <a:rPr lang="en-US" smtClean="0"/>
-              <a:t>9/12/2023</a:t>
+              <a:t>9/15/2023</a:t>
             </a:fld>
             <a:endParaRPr lang="en-US"/>
           </a:p>
@@ -2756,7 +2756,7 @@
           <a:p>
             <a:fld id="{CBDECC62-F7E9-462B-97BB-B83B1328C7D8}" type="datetime1">
               <a:rPr lang="en-US" smtClean="0"/>
-              <a:t>9/12/2023</a:t>
+              <a:t>9/15/2023</a:t>
             </a:fld>
             <a:endParaRPr lang="en-US"/>
           </a:p>
@@ -3044,7 +3044,7 @@
           <a:p>
             <a:fld id="{8D6DC7DD-2A07-4C95-8867-C4D1C70FE372}" type="datetime1">
               <a:rPr lang="en-US" smtClean="0"/>
-              <a:t>9/12/2023</a:t>
+              <a:t>9/15/2023</a:t>
             </a:fld>
             <a:endParaRPr lang="en-US"/>
           </a:p>
@@ -3285,7 +3285,7 @@
           <a:p>
             <a:fld id="{D2E978A4-5ACE-4B30-BABB-95072D253F46}" type="datetime1">
               <a:rPr lang="en-US" smtClean="0"/>
-              <a:t>9/12/2023</a:t>
+              <a:t>9/15/2023</a:t>
             </a:fld>
             <a:endParaRPr lang="en-US"/>
           </a:p>
@@ -5539,7 +5539,7 @@
         <p:spPr>
           <a:xfrm>
             <a:off x="6306106" y="1556265"/>
-            <a:ext cx="5476718" cy="1754326"/>
+            <a:ext cx="5476718" cy="3970318"/>
           </a:xfrm>
           <a:prstGeom prst="rect">
             <a:avLst/>
@@ -5558,7 +5558,7 @@
             </a:pPr>
             <a:r>
               <a:rPr lang="en-US" dirty="0"/>
-              <a:t>Development of buildings internal load forecast models</a:t>
+              <a:t>Development of the building’s internal load forecast models</a:t>
             </a:r>
           </a:p>
           <a:p>
@@ -5568,7 +5568,7 @@
             </a:pPr>
             <a:r>
               <a:rPr lang="en-US" dirty="0"/>
-              <a:t>Work is in progress</a:t>
+              <a:t>Pecan Street data analysis done. The use of appliances is highly uncorrelated, hence not interesting for prediction.</a:t>
             </a:r>
           </a:p>
           <a:p>
@@ -5578,7 +5578,7 @@
             </a:pPr>
             <a:r>
               <a:rPr lang="en-US" dirty="0"/>
-              <a:t>Development of Intelligent (RL) controllers for single building control</a:t>
+              <a:t>Development of Intelligent (RL) controllers for single-building control</a:t>
             </a:r>
           </a:p>
           <a:p>
@@ -5588,7 +5588,37 @@
             </a:pPr>
             <a:r>
               <a:rPr lang="en-US" dirty="0"/>
-              <a:t>Work is in progress</a:t>
+              <a:t>Dynamical system model with temporal logic constraints.</a:t>
+            </a:r>
+          </a:p>
+          <a:p>
+            <a:pPr marL="800100" lvl="1" indent="-342900">
+              <a:buFont typeface="+mj-lt"/>
+              <a:buAutoNum type="arabicPeriod"/>
+            </a:pPr>
+            <a:r>
+              <a:rPr lang="en-US" dirty="0"/>
+              <a:t>Can be tested on any dynamical system.</a:t>
+            </a:r>
+          </a:p>
+          <a:p>
+            <a:pPr marL="800100" lvl="1" indent="-342900">
+              <a:buFont typeface="+mj-lt"/>
+              <a:buAutoNum type="arabicPeriod"/>
+            </a:pPr>
+            <a:r>
+              <a:rPr lang="en-US" dirty="0"/>
+              <a:t>Off-grid house model – RL with Temporal Logic constraints, including safety constraints.</a:t>
+            </a:r>
+          </a:p>
+          <a:p>
+            <a:pPr marL="800100" lvl="1" indent="-342900">
+              <a:buFont typeface="+mj-lt"/>
+              <a:buAutoNum type="arabicPeriod"/>
+            </a:pPr>
+            <a:r>
+              <a:rPr lang="en-US" dirty="0"/>
+              <a:t>Start from the off-grid model and then proceed to grid-connected model flexibility provisioning.</a:t>
             </a:r>
           </a:p>
         </p:txBody>

</xml_diff>